<commit_message>
Updated spatial registration functionality
</commit_message>
<xml_diff>
--- a/Documentation/Tutorials/NeuroDOT_Tutorial_Full_Data_Processing_Overview.pptx
+++ b/Documentation/Tutorials/NeuroDOT_Tutorial_Full_Data_Processing_Overview.pptx
@@ -226,7 +226,7 @@
           <a:p>
             <a:fld id="{59435505-D4AB-4F36-857A-9B945E75E4E8}" type="datetimeFigureOut">
               <a:rPr lang="en-US" smtClean="0"/>
-              <a:t>10/1/2018</a:t>
+              <a:t>10/6/2018</a:t>
             </a:fld>
             <a:endParaRPr lang="en-US"/>
           </a:p>
@@ -1218,7 +1218,7 @@
           <a:p>
             <a:fld id="{8BC45AE7-8192-4799-AF23-713D46C29BA2}" type="datetime1">
               <a:rPr lang="en-US" smtClean="0"/>
-              <a:t>10/2/2018</a:t>
+              <a:t>10/6/2018</a:t>
             </a:fld>
             <a:endParaRPr lang="en-US"/>
           </a:p>
@@ -1469,7 +1469,7 @@
           <a:p>
             <a:fld id="{A29D4251-19EE-46FE-836D-4603731B1857}" type="datetime1">
               <a:rPr lang="en-US" smtClean="0"/>
-              <a:t>10/2/2018</a:t>
+              <a:t>10/6/2018</a:t>
             </a:fld>
             <a:endParaRPr lang="en-US"/>
           </a:p>
@@ -1783,7 +1783,7 @@
           <a:p>
             <a:fld id="{C919F7C3-D4C8-4A2A-B083-1A7DE0B1AD1F}" type="datetime1">
               <a:rPr lang="en-US" smtClean="0"/>
-              <a:t>10/2/2018</a:t>
+              <a:t>10/6/2018</a:t>
             </a:fld>
             <a:endParaRPr lang="en-US"/>
           </a:p>
@@ -2110,7 +2110,7 @@
           <a:p>
             <a:fld id="{6C3F0D31-F653-46F9-9701-1A5375D696B6}" type="datetime1">
               <a:rPr lang="en-US" smtClean="0"/>
-              <a:t>10/2/2018</a:t>
+              <a:t>10/6/2018</a:t>
             </a:fld>
             <a:endParaRPr lang="en-US"/>
           </a:p>
@@ -2424,7 +2424,7 @@
           <a:p>
             <a:fld id="{397D6CD1-9B73-46C1-AAB1-25E92110DAB4}" type="datetime1">
               <a:rPr lang="en-US" smtClean="0"/>
-              <a:t>10/2/2018</a:t>
+              <a:t>10/6/2018</a:t>
             </a:fld>
             <a:endParaRPr lang="en-US"/>
           </a:p>
@@ -2811,7 +2811,7 @@
           <a:p>
             <a:fld id="{6407719D-9E96-44D6-9DFB-15AB3DAB0115}" type="datetime1">
               <a:rPr lang="en-US" smtClean="0"/>
-              <a:t>10/2/2018</a:t>
+              <a:t>10/6/2018</a:t>
             </a:fld>
             <a:endParaRPr lang="en-US"/>
           </a:p>
@@ -2981,7 +2981,7 @@
           <a:p>
             <a:fld id="{366FC019-09F8-4963-8CE1-CC3639FB23B6}" type="datetime1">
               <a:rPr lang="en-US" smtClean="0"/>
-              <a:t>10/2/2018</a:t>
+              <a:t>10/6/2018</a:t>
             </a:fld>
             <a:endParaRPr lang="en-US"/>
           </a:p>
@@ -3161,7 +3161,7 @@
           <a:p>
             <a:fld id="{0394D83C-727E-4994-9AC5-3D85D03A5D97}" type="datetime1">
               <a:rPr lang="en-US" smtClean="0"/>
-              <a:t>10/2/2018</a:t>
+              <a:t>10/6/2018</a:t>
             </a:fld>
             <a:endParaRPr lang="en-US"/>
           </a:p>
@@ -3337,7 +3337,7 @@
           <a:p>
             <a:fld id="{43D4CAD5-1A1E-4571-ADC4-920D5A198B00}" type="datetime1">
               <a:rPr lang="en-US" smtClean="0"/>
-              <a:t>10/2/2018</a:t>
+              <a:t>10/6/2018</a:t>
             </a:fld>
             <a:endParaRPr lang="en-US"/>
           </a:p>
@@ -3584,7 +3584,7 @@
           <a:p>
             <a:fld id="{3EEF5E78-6815-4D20-8305-2A00CC62004C}" type="datetime1">
               <a:rPr lang="en-US" smtClean="0"/>
-              <a:t>10/2/2018</a:t>
+              <a:t>10/6/2018</a:t>
             </a:fld>
             <a:endParaRPr lang="en-US"/>
           </a:p>
@@ -3816,7 +3816,7 @@
           <a:p>
             <a:fld id="{7A7E7374-F149-439B-9DB7-701B96A69E19}" type="datetime1">
               <a:rPr lang="en-US" smtClean="0"/>
-              <a:t>10/2/2018</a:t>
+              <a:t>10/6/2018</a:t>
             </a:fld>
             <a:endParaRPr lang="en-US"/>
           </a:p>
@@ -4190,7 +4190,7 @@
           <a:p>
             <a:fld id="{82A02993-795B-4E53-944E-D8E48B7261F8}" type="datetime1">
               <a:rPr lang="en-US" smtClean="0"/>
-              <a:t>10/2/2018</a:t>
+              <a:t>10/6/2018</a:t>
             </a:fld>
             <a:endParaRPr lang="en-US"/>
           </a:p>
@@ -4313,7 +4313,7 @@
           <a:p>
             <a:fld id="{A4C4E660-DF76-4715-B9D5-C04A4037BEF5}" type="datetime1">
               <a:rPr lang="en-US" smtClean="0"/>
-              <a:t>10/2/2018</a:t>
+              <a:t>10/6/2018</a:t>
             </a:fld>
             <a:endParaRPr lang="en-US"/>
           </a:p>
@@ -4408,7 +4408,7 @@
           <a:p>
             <a:fld id="{22758909-A404-45AE-908B-FDC129553D09}" type="datetime1">
               <a:rPr lang="en-US" smtClean="0"/>
-              <a:t>10/2/2018</a:t>
+              <a:t>10/6/2018</a:t>
             </a:fld>
             <a:endParaRPr lang="en-US"/>
           </a:p>
@@ -4663,7 +4663,7 @@
           <a:p>
             <a:fld id="{365E464E-9648-4075-A65D-B489F5412B23}" type="datetime1">
               <a:rPr lang="en-US" smtClean="0"/>
-              <a:t>10/2/2018</a:t>
+              <a:t>10/6/2018</a:t>
             </a:fld>
             <a:endParaRPr lang="en-US"/>
           </a:p>
@@ -4926,7 +4926,7 @@
           <a:p>
             <a:fld id="{ED563D1D-6C41-43CE-A334-EBD14DE61791}" type="datetime1">
               <a:rPr lang="en-US" smtClean="0"/>
-              <a:t>10/2/2018</a:t>
+              <a:t>10/6/2018</a:t>
             </a:fld>
             <a:endParaRPr lang="en-US"/>
           </a:p>
@@ -5674,7 +5674,7 @@
           <a:p>
             <a:fld id="{908D44A4-0DF4-40AF-912F-956ED7A7E78C}" type="datetime1">
               <a:rPr lang="en-US" smtClean="0"/>
-              <a:t>10/2/2018</a:t>
+              <a:t>10/6/2018</a:t>
             </a:fld>
             <a:endParaRPr lang="en-US"/>
           </a:p>
@@ -6989,32 +6989,8 @@
                 </a:solidFill>
                 <a:latin typeface="Calibri" panose="020F0502020204030204"/>
               </a:rPr>
-              <a:t>right, </a:t>
-            </a:r>
-            <a:r>
-              <a:rPr lang="en-US" dirty="0" smtClean="0">
-                <a:solidFill>
-                  <a:prstClr val="white"/>
-                </a:solidFill>
-                <a:latin typeface="Calibri" panose="020F0502020204030204"/>
-              </a:rPr>
-              <a:t>as </a:t>
-            </a:r>
-            <a:r>
-              <a:rPr lang="en-US" dirty="0" smtClean="0">
-                <a:solidFill>
-                  <a:prstClr val="white"/>
-                </a:solidFill>
-                <a:latin typeface="Calibri" panose="020F0502020204030204"/>
-              </a:rPr>
-              <a:t>shown below:</a:t>
-            </a:r>
-            <a:endParaRPr lang="en-US" dirty="0" smtClean="0">
-              <a:solidFill>
-                <a:prstClr val="white"/>
-              </a:solidFill>
-              <a:latin typeface="Calibri" panose="020F0502020204030204"/>
-            </a:endParaRPr>
+              <a:t>right, as shown below:</a:t>
+            </a:r>
           </a:p>
           <a:p>
             <a:pPr marL="400050" lvl="1" indent="0" defTabSz="914400">
@@ -7239,17 +7215,7 @@
                 <a:latin typeface="Courier New" panose="02070309020205020404" pitchFamily="49" charset="0"/>
                 <a:cs typeface="Courier New" panose="02070309020205020404" pitchFamily="49" charset="0"/>
               </a:rPr>
-              <a:t> </a:t>
-            </a:r>
-            <a:r>
-              <a:rPr lang="en-US" sz="1200" b="1" dirty="0">
-                <a:solidFill>
-                  <a:schemeClr val="tx1"/>
-                </a:solidFill>
-                <a:latin typeface="Courier New" panose="02070309020205020404" pitchFamily="49" charset="0"/>
-                <a:cs typeface="Courier New" panose="02070309020205020404" pitchFamily="49" charset="0"/>
-              </a:rPr>
-              <a:t>= </a:t>
+              <a:t> = </a:t>
             </a:r>
             <a:r>
               <a:rPr lang="en-US" sz="1200" b="1" dirty="0" err="1">
@@ -7359,17 +7325,7 @@
                 <a:latin typeface="Courier New" panose="02070309020205020404" pitchFamily="49" charset="0"/>
                 <a:cs typeface="Courier New" panose="02070309020205020404" pitchFamily="49" charset="0"/>
               </a:rPr>
-              <a:t> </a:t>
-            </a:r>
-            <a:r>
-              <a:rPr lang="en-US" sz="1200" b="1" dirty="0">
-                <a:solidFill>
-                  <a:schemeClr val="tx1"/>
-                </a:solidFill>
-                <a:latin typeface="Courier New" panose="02070309020205020404" pitchFamily="49" charset="0"/>
-                <a:cs typeface="Courier New" panose="02070309020205020404" pitchFamily="49" charset="0"/>
-              </a:rPr>
-              <a:t>= </a:t>
+              <a:t> = </a:t>
             </a:r>
             <a:r>
               <a:rPr lang="en-US" sz="1200" b="1" dirty="0" err="1">
@@ -7489,7 +7445,17 @@
                 <a:latin typeface="Courier New" panose="02070309020205020404" pitchFamily="49" charset="0"/>
                 <a:cs typeface="Courier New" panose="02070309020205020404" pitchFamily="49" charset="0"/>
               </a:rPr>
-              <a:t> </a:t>
+              <a:t> = </a:t>
+            </a:r>
+            <a:r>
+              <a:rPr lang="en-US" sz="1200" b="1" dirty="0" err="1">
+                <a:solidFill>
+                  <a:schemeClr val="tx1"/>
+                </a:solidFill>
+                <a:latin typeface="Courier New" panose="02070309020205020404" pitchFamily="49" charset="0"/>
+                <a:cs typeface="Courier New" panose="02070309020205020404" pitchFamily="49" charset="0"/>
+              </a:rPr>
+              <a:t>lowpass</a:t>
             </a:r>
             <a:r>
               <a:rPr lang="en-US" sz="1200" b="1" dirty="0">
@@ -7499,7 +7465,7 @@
                 <a:latin typeface="Courier New" panose="02070309020205020404" pitchFamily="49" charset="0"/>
                 <a:cs typeface="Courier New" panose="02070309020205020404" pitchFamily="49" charset="0"/>
               </a:rPr>
-              <a:t>= </a:t>
+              <a:t>(</a:t>
             </a:r>
             <a:r>
               <a:rPr lang="en-US" sz="1200" b="1" dirty="0" err="1">
@@ -7509,7 +7475,7 @@
                 <a:latin typeface="Courier New" panose="02070309020205020404" pitchFamily="49" charset="0"/>
                 <a:cs typeface="Courier New" panose="02070309020205020404" pitchFamily="49" charset="0"/>
               </a:rPr>
-              <a:t>lowpass</a:t>
+              <a:t>lmdata</a:t>
             </a:r>
             <a:r>
               <a:rPr lang="en-US" sz="1200" b="1" dirty="0">
@@ -7519,37 +7485,7 @@
                 <a:latin typeface="Courier New" panose="02070309020205020404" pitchFamily="49" charset="0"/>
                 <a:cs typeface="Courier New" panose="02070309020205020404" pitchFamily="49" charset="0"/>
               </a:rPr>
-              <a:t>(</a:t>
-            </a:r>
-            <a:r>
-              <a:rPr lang="en-US" sz="1200" b="1" dirty="0" err="1">
-                <a:solidFill>
-                  <a:schemeClr val="tx1"/>
-                </a:solidFill>
-                <a:latin typeface="Courier New" panose="02070309020205020404" pitchFamily="49" charset="0"/>
-                <a:cs typeface="Courier New" panose="02070309020205020404" pitchFamily="49" charset="0"/>
-              </a:rPr>
-              <a:t>lmdata</a:t>
-            </a:r>
-            <a:r>
-              <a:rPr lang="en-US" sz="1200" b="1" dirty="0">
-                <a:solidFill>
-                  <a:schemeClr val="tx1"/>
-                </a:solidFill>
-                <a:latin typeface="Courier New" panose="02070309020205020404" pitchFamily="49" charset="0"/>
-                <a:cs typeface="Courier New" panose="02070309020205020404" pitchFamily="49" charset="0"/>
-              </a:rPr>
-              <a:t>, </a:t>
-            </a:r>
-            <a:r>
-              <a:rPr lang="en-US" sz="1200" b="1" dirty="0">
-                <a:solidFill>
-                  <a:schemeClr val="tx1"/>
-                </a:solidFill>
-                <a:latin typeface="Courier New" panose="02070309020205020404" pitchFamily="49" charset="0"/>
-                <a:cs typeface="Courier New" panose="02070309020205020404" pitchFamily="49" charset="0"/>
-              </a:rPr>
-              <a:t>1, </a:t>
+              <a:t>, 1, </a:t>
             </a:r>
             <a:r>
               <a:rPr lang="en-US" sz="1200" b="1" dirty="0" err="1">
@@ -7659,17 +7595,7 @@
                 <a:latin typeface="Courier New" panose="02070309020205020404" pitchFamily="49" charset="0"/>
                 <a:cs typeface="Courier New" panose="02070309020205020404" pitchFamily="49" charset="0"/>
               </a:rPr>
-              <a:t>, </a:t>
-            </a:r>
-            <a:r>
-              <a:rPr lang="en-US" sz="1200" b="1" dirty="0">
-                <a:solidFill>
-                  <a:schemeClr val="tx1"/>
-                </a:solidFill>
-                <a:latin typeface="Courier New" panose="02070309020205020404" pitchFamily="49" charset="0"/>
-                <a:cs typeface="Courier New" panose="02070309020205020404" pitchFamily="49" charset="0"/>
-              </a:rPr>
-              <a:t>info); </a:t>
+              <a:t>, info); </a:t>
             </a:r>
             <a:r>
               <a:rPr lang="en-US" sz="1200" b="1" dirty="0" smtClean="0">
@@ -7739,7 +7665,17 @@
                 <a:latin typeface="Courier New" panose="02070309020205020404" pitchFamily="49" charset="0"/>
                 <a:cs typeface="Courier New" panose="02070309020205020404" pitchFamily="49" charset="0"/>
               </a:rPr>
-              <a:t>, </a:t>
+              <a:t>, ~] = </a:t>
+            </a:r>
+            <a:r>
+              <a:rPr lang="en-US" sz="1200" b="1" dirty="0" err="1">
+                <a:solidFill>
+                  <a:schemeClr val="tx1"/>
+                </a:solidFill>
+                <a:latin typeface="Courier New" panose="02070309020205020404" pitchFamily="49" charset="0"/>
+                <a:cs typeface="Courier New" panose="02070309020205020404" pitchFamily="49" charset="0"/>
+              </a:rPr>
+              <a:t>regcorr</a:t>
             </a:r>
             <a:r>
               <a:rPr lang="en-US" sz="1200" b="1" dirty="0">
@@ -7749,7 +7685,7 @@
                 <a:latin typeface="Courier New" panose="02070309020205020404" pitchFamily="49" charset="0"/>
                 <a:cs typeface="Courier New" panose="02070309020205020404" pitchFamily="49" charset="0"/>
               </a:rPr>
-              <a:t>~] = </a:t>
+              <a:t>(</a:t>
             </a:r>
             <a:r>
               <a:rPr lang="en-US" sz="1200" b="1" dirty="0" err="1">
@@ -7759,7 +7695,7 @@
                 <a:latin typeface="Courier New" panose="02070309020205020404" pitchFamily="49" charset="0"/>
                 <a:cs typeface="Courier New" panose="02070309020205020404" pitchFamily="49" charset="0"/>
               </a:rPr>
-              <a:t>regcorr</a:t>
+              <a:t>lmdata</a:t>
             </a:r>
             <a:r>
               <a:rPr lang="en-US" sz="1200" b="1" dirty="0">
@@ -7769,37 +7705,7 @@
                 <a:latin typeface="Courier New" panose="02070309020205020404" pitchFamily="49" charset="0"/>
                 <a:cs typeface="Courier New" panose="02070309020205020404" pitchFamily="49" charset="0"/>
               </a:rPr>
-              <a:t>(</a:t>
-            </a:r>
-            <a:r>
-              <a:rPr lang="en-US" sz="1200" b="1" dirty="0" err="1">
-                <a:solidFill>
-                  <a:schemeClr val="tx1"/>
-                </a:solidFill>
-                <a:latin typeface="Courier New" panose="02070309020205020404" pitchFamily="49" charset="0"/>
-                <a:cs typeface="Courier New" panose="02070309020205020404" pitchFamily="49" charset="0"/>
-              </a:rPr>
-              <a:t>lmdata</a:t>
-            </a:r>
-            <a:r>
-              <a:rPr lang="en-US" sz="1200" b="1" dirty="0">
-                <a:solidFill>
-                  <a:schemeClr val="tx1"/>
-                </a:solidFill>
-                <a:latin typeface="Courier New" panose="02070309020205020404" pitchFamily="49" charset="0"/>
-                <a:cs typeface="Courier New" panose="02070309020205020404" pitchFamily="49" charset="0"/>
-              </a:rPr>
-              <a:t>, </a:t>
-            </a:r>
-            <a:r>
-              <a:rPr lang="en-US" sz="1200" b="1" dirty="0">
-                <a:solidFill>
-                  <a:schemeClr val="tx1"/>
-                </a:solidFill>
-                <a:latin typeface="Courier New" panose="02070309020205020404" pitchFamily="49" charset="0"/>
-                <a:cs typeface="Courier New" panose="02070309020205020404" pitchFamily="49" charset="0"/>
-              </a:rPr>
-              <a:t>info, hem);</a:t>
+              <a:t>, info, hem);</a:t>
             </a:r>
           </a:p>
           <a:p>
@@ -7829,7 +7735,17 @@
                 <a:latin typeface="Courier New" panose="02070309020205020404" pitchFamily="49" charset="0"/>
                 <a:cs typeface="Courier New" panose="02070309020205020404" pitchFamily="49" charset="0"/>
               </a:rPr>
-              <a:t> </a:t>
+              <a:t> = </a:t>
+            </a:r>
+            <a:r>
+              <a:rPr lang="en-US" sz="1200" b="1" dirty="0" err="1">
+                <a:solidFill>
+                  <a:schemeClr val="tx1"/>
+                </a:solidFill>
+                <a:latin typeface="Courier New" panose="02070309020205020404" pitchFamily="49" charset="0"/>
+                <a:cs typeface="Courier New" panose="02070309020205020404" pitchFamily="49" charset="0"/>
+              </a:rPr>
+              <a:t>lowpass</a:t>
             </a:r>
             <a:r>
               <a:rPr lang="en-US" sz="1200" b="1" dirty="0">
@@ -7839,7 +7755,7 @@
                 <a:latin typeface="Courier New" panose="02070309020205020404" pitchFamily="49" charset="0"/>
                 <a:cs typeface="Courier New" panose="02070309020205020404" pitchFamily="49" charset="0"/>
               </a:rPr>
-              <a:t>= </a:t>
+              <a:t>(</a:t>
             </a:r>
             <a:r>
               <a:rPr lang="en-US" sz="1200" b="1" dirty="0" err="1">
@@ -7849,7 +7765,7 @@
                 <a:latin typeface="Courier New" panose="02070309020205020404" pitchFamily="49" charset="0"/>
                 <a:cs typeface="Courier New" panose="02070309020205020404" pitchFamily="49" charset="0"/>
               </a:rPr>
-              <a:t>lowpass</a:t>
+              <a:t>lmdata</a:t>
             </a:r>
             <a:r>
               <a:rPr lang="en-US" sz="1200" b="1" dirty="0">
@@ -7859,37 +7775,7 @@
                 <a:latin typeface="Courier New" panose="02070309020205020404" pitchFamily="49" charset="0"/>
                 <a:cs typeface="Courier New" panose="02070309020205020404" pitchFamily="49" charset="0"/>
               </a:rPr>
-              <a:t>(</a:t>
-            </a:r>
-            <a:r>
-              <a:rPr lang="en-US" sz="1200" b="1" dirty="0" err="1">
-                <a:solidFill>
-                  <a:schemeClr val="tx1"/>
-                </a:solidFill>
-                <a:latin typeface="Courier New" panose="02070309020205020404" pitchFamily="49" charset="0"/>
-                <a:cs typeface="Courier New" panose="02070309020205020404" pitchFamily="49" charset="0"/>
-              </a:rPr>
-              <a:t>lmdata</a:t>
-            </a:r>
-            <a:r>
-              <a:rPr lang="en-US" sz="1200" b="1" dirty="0">
-                <a:solidFill>
-                  <a:schemeClr val="tx1"/>
-                </a:solidFill>
-                <a:latin typeface="Courier New" panose="02070309020205020404" pitchFamily="49" charset="0"/>
-                <a:cs typeface="Courier New" panose="02070309020205020404" pitchFamily="49" charset="0"/>
-              </a:rPr>
-              <a:t>, </a:t>
-            </a:r>
-            <a:r>
-              <a:rPr lang="en-US" sz="1200" b="1" dirty="0">
-                <a:solidFill>
-                  <a:schemeClr val="tx1"/>
-                </a:solidFill>
-                <a:latin typeface="Courier New" panose="02070309020205020404" pitchFamily="49" charset="0"/>
-                <a:cs typeface="Courier New" panose="02070309020205020404" pitchFamily="49" charset="0"/>
-              </a:rPr>
-              <a:t>0.5, </a:t>
+              <a:t>, 0.5, </a:t>
             </a:r>
             <a:r>
               <a:rPr lang="en-US" sz="1200" b="1" dirty="0" err="1">
@@ -7979,7 +7865,17 @@
                 <a:latin typeface="Courier New" panose="02070309020205020404" pitchFamily="49" charset="0"/>
                 <a:cs typeface="Courier New" panose="02070309020205020404" pitchFamily="49" charset="0"/>
               </a:rPr>
-              <a:t>, </a:t>
+              <a:t>, info] = </a:t>
+            </a:r>
+            <a:r>
+              <a:rPr lang="en-US" sz="1200" b="1" dirty="0" err="1">
+                <a:solidFill>
+                  <a:schemeClr val="tx1"/>
+                </a:solidFill>
+                <a:latin typeface="Courier New" panose="02070309020205020404" pitchFamily="49" charset="0"/>
+                <a:cs typeface="Courier New" panose="02070309020205020404" pitchFamily="49" charset="0"/>
+              </a:rPr>
+              <a:t>resample_tts</a:t>
             </a:r>
             <a:r>
               <a:rPr lang="en-US" sz="1200" b="1" dirty="0">
@@ -7989,7 +7885,7 @@
                 <a:latin typeface="Courier New" panose="02070309020205020404" pitchFamily="49" charset="0"/>
                 <a:cs typeface="Courier New" panose="02070309020205020404" pitchFamily="49" charset="0"/>
               </a:rPr>
-              <a:t>info] = </a:t>
+              <a:t>(</a:t>
             </a:r>
             <a:r>
               <a:rPr lang="en-US" sz="1200" b="1" dirty="0" err="1">
@@ -7999,7 +7895,7 @@
                 <a:latin typeface="Courier New" panose="02070309020205020404" pitchFamily="49" charset="0"/>
                 <a:cs typeface="Courier New" panose="02070309020205020404" pitchFamily="49" charset="0"/>
               </a:rPr>
-              <a:t>resample_tts</a:t>
+              <a:t>lmdata</a:t>
             </a:r>
             <a:r>
               <a:rPr lang="en-US" sz="1200" b="1" dirty="0">
@@ -8009,37 +7905,7 @@
                 <a:latin typeface="Courier New" panose="02070309020205020404" pitchFamily="49" charset="0"/>
                 <a:cs typeface="Courier New" panose="02070309020205020404" pitchFamily="49" charset="0"/>
               </a:rPr>
-              <a:t>(</a:t>
-            </a:r>
-            <a:r>
-              <a:rPr lang="en-US" sz="1200" b="1" dirty="0" err="1">
-                <a:solidFill>
-                  <a:schemeClr val="tx1"/>
-                </a:solidFill>
-                <a:latin typeface="Courier New" panose="02070309020205020404" pitchFamily="49" charset="0"/>
-                <a:cs typeface="Courier New" panose="02070309020205020404" pitchFamily="49" charset="0"/>
-              </a:rPr>
-              <a:t>lmdata</a:t>
-            </a:r>
-            <a:r>
-              <a:rPr lang="en-US" sz="1200" b="1" dirty="0">
-                <a:solidFill>
-                  <a:schemeClr val="tx1"/>
-                </a:solidFill>
-                <a:latin typeface="Courier New" panose="02070309020205020404" pitchFamily="49" charset="0"/>
-                <a:cs typeface="Courier New" panose="02070309020205020404" pitchFamily="49" charset="0"/>
-              </a:rPr>
-              <a:t>, </a:t>
-            </a:r>
-            <a:r>
-              <a:rPr lang="en-US" sz="1200" b="1" dirty="0">
-                <a:solidFill>
-                  <a:schemeClr val="tx1"/>
-                </a:solidFill>
-                <a:latin typeface="Courier New" panose="02070309020205020404" pitchFamily="49" charset="0"/>
-                <a:cs typeface="Courier New" panose="02070309020205020404" pitchFamily="49" charset="0"/>
-              </a:rPr>
-              <a:t>info, 1, 1e-5); </a:t>
+              <a:t>, info, 1, 1e-5); </a:t>
             </a:r>
             <a:r>
               <a:rPr lang="en-US" sz="1200" b="1" dirty="0" smtClean="0">
@@ -8114,7 +7980,16 @@
                 </a:solidFill>
                 <a:latin typeface="Calibri" panose="020F0502020204030204"/>
               </a:rPr>
-              <a:t>Subsequent </a:t>
+              <a:t>Subsequent plots and images show </a:t>
+            </a:r>
+            <a:r>
+              <a:rPr lang="en-US" i="1" dirty="0" smtClean="0">
+                <a:solidFill>
+                  <a:prstClr val="white"/>
+                </a:solidFill>
+                <a:latin typeface="Calibri" panose="020F0502020204030204"/>
+              </a:rPr>
+              <a:t>differential measurements</a:t>
             </a:r>
             <a:r>
               <a:rPr lang="en-US" dirty="0" smtClean="0">
@@ -8123,34 +7998,7 @@
                 </a:solidFill>
                 <a:latin typeface="Calibri" panose="020F0502020204030204"/>
               </a:rPr>
-              <a:t>plots and images show </a:t>
-            </a:r>
-            <a:r>
-              <a:rPr lang="en-US" i="1" dirty="0" smtClean="0">
-                <a:solidFill>
-                  <a:prstClr val="white"/>
-                </a:solidFill>
-                <a:latin typeface="Calibri" panose="020F0502020204030204"/>
-              </a:rPr>
-              <a:t>differential measurements</a:t>
-            </a:r>
-            <a:r>
-              <a:rPr lang="en-US" dirty="0" smtClean="0">
-                <a:solidFill>
-                  <a:prstClr val="white"/>
-                </a:solidFill>
-                <a:latin typeface="Calibri" panose="020F0502020204030204"/>
-              </a:rPr>
-              <a:t>, computed as the logarithm of the ratio of each signal and its temporal </a:t>
-            </a:r>
-            <a:r>
-              <a:rPr lang="en-US" dirty="0" smtClean="0">
-                <a:solidFill>
-                  <a:prstClr val="white"/>
-                </a:solidFill>
-                <a:latin typeface="Calibri" panose="020F0502020204030204"/>
-              </a:rPr>
-              <a:t>average</a:t>
+              <a:t>, computed as the logarithm of the ratio of each signal and its temporal average</a:t>
             </a:r>
           </a:p>
           <a:p>
@@ -8169,25 +8017,7 @@
                 </a:solidFill>
                 <a:latin typeface="Calibri" panose="020F0502020204030204"/>
               </a:rPr>
-              <a:t>For a more in-depth exploration of pre-processing </a:t>
-            </a:r>
-            <a:r>
-              <a:rPr lang="en-US" dirty="0" smtClean="0">
-                <a:solidFill>
-                  <a:prstClr val="white"/>
-                </a:solidFill>
-                <a:latin typeface="Calibri" panose="020F0502020204030204"/>
-              </a:rPr>
-              <a:t>parameter </a:t>
-            </a:r>
-            <a:r>
-              <a:rPr lang="en-US" dirty="0" smtClean="0">
-                <a:solidFill>
-                  <a:prstClr val="white"/>
-                </a:solidFill>
-                <a:latin typeface="Calibri" panose="020F0502020204030204"/>
-              </a:rPr>
-              <a:t>settings, please see the Tutorial on Pre-processing.</a:t>
+              <a:t>For a more in-depth exploration of pre-processing parameter settings, please see the Tutorial on Pre-processing.</a:t>
             </a:r>
             <a:endParaRPr lang="en-US" dirty="0">
               <a:solidFill>
@@ -10934,16 +10764,7 @@
                 </a:solidFill>
                 <a:latin typeface="Calibri" panose="020F0502020204030204"/>
               </a:rPr>
-              <a:t>2012</a:t>
-            </a:r>
-            <a:r>
-              <a:rPr lang="en-US" sz="2000" dirty="0" smtClean="0">
-                <a:solidFill>
-                  <a:prstClr val="white"/>
-                </a:solidFill>
-                <a:latin typeface="Calibri" panose="020F0502020204030204"/>
-              </a:rPr>
-              <a:t>)</a:t>
+              <a:t>2012)</a:t>
             </a:r>
           </a:p>
           <a:p>
@@ -11425,8 +11246,35 @@
                 <a:latin typeface="Courier New" panose="02070309020205020404" pitchFamily="49" charset="0"/>
                 <a:cs typeface="Courier New" panose="02070309020205020404" pitchFamily="49" charset="0"/>
               </a:rPr>
-              <a:t>, dim, 5);</a:t>
-            </a:r>
+              <a:t>, dim</a:t>
+            </a:r>
+            <a:r>
+              <a:rPr lang="en-US" sz="1500" b="1">
+                <a:solidFill>
+                  <a:schemeClr val="tx1"/>
+                </a:solidFill>
+                <a:latin typeface="Courier New" panose="02070309020205020404" pitchFamily="49" charset="0"/>
+                <a:cs typeface="Courier New" panose="02070309020205020404" pitchFamily="49" charset="0"/>
+              </a:rPr>
+              <a:t>, </a:t>
+            </a:r>
+            <a:r>
+              <a:rPr lang="en-US" sz="1500" b="1" smtClean="0">
+                <a:solidFill>
+                  <a:schemeClr val="tx1"/>
+                </a:solidFill>
+                <a:latin typeface="Courier New" panose="02070309020205020404" pitchFamily="49" charset="0"/>
+                <a:cs typeface="Courier New" panose="02070309020205020404" pitchFamily="49" charset="0"/>
+              </a:rPr>
+              <a:t>3);</a:t>
+            </a:r>
+            <a:endParaRPr lang="en-US" sz="1500" b="1" dirty="0">
+              <a:solidFill>
+                <a:schemeClr val="tx1"/>
+              </a:solidFill>
+              <a:latin typeface="Courier New" panose="02070309020205020404" pitchFamily="49" charset="0"/>
+              <a:cs typeface="Courier New" panose="02070309020205020404" pitchFamily="49" charset="0"/>
+            </a:endParaRPr>
           </a:p>
           <a:p>
             <a:pPr marL="400050" lvl="1" indent="0">
@@ -11609,16 +11457,7 @@
                 </a:solidFill>
                 <a:latin typeface="Calibri" panose="020F0502020204030204"/>
               </a:rPr>
-              <a:t>Image </a:t>
-            </a:r>
-            <a:r>
-              <a:rPr lang="en-US" sz="2000" dirty="0" smtClean="0">
-                <a:solidFill>
-                  <a:prstClr val="white"/>
-                </a:solidFill>
-                <a:latin typeface="Calibri" panose="020F0502020204030204"/>
-              </a:rPr>
-              <a:t>volumes store estimated absorption values as voxels by time by wavelength. </a:t>
+              <a:t>Image volumes store estimated absorption values as voxels by time by wavelength. </a:t>
             </a:r>
           </a:p>
           <a:p>
@@ -13099,16 +12938,7 @@
                 </a:solidFill>
                 <a:latin typeface="Calibri" panose="020F0502020204030204"/>
               </a:rPr>
-              <a:t>The following will load in the anatomical data used for the light model and spatially register it to th</a:t>
-            </a:r>
-            <a:r>
-              <a:rPr lang="en-US" sz="2000" dirty="0" smtClean="0">
-                <a:solidFill>
-                  <a:prstClr val="white"/>
-                </a:solidFill>
-                <a:latin typeface="Calibri" panose="020F0502020204030204"/>
-              </a:rPr>
-              <a:t>e reconstructed optical data.</a:t>
+              <a:t>The following will load in the anatomical data used for the light model and spatially register it to the reconstructed optical data.</a:t>
             </a:r>
           </a:p>
           <a:p>
@@ -13439,15 +13269,7 @@
                   <a:srgbClr val="FF0000"/>
                 </a:solidFill>
               </a:rPr>
-              <a:t>Visualization of Reconstructed </a:t>
-            </a:r>
-            <a:r>
-              <a:rPr lang="en-US" dirty="0" smtClean="0">
-                <a:solidFill>
-                  <a:srgbClr val="FF0000"/>
-                </a:solidFill>
-              </a:rPr>
-              <a:t>Volumetric Images</a:t>
+              <a:t>Visualization of Reconstructed Volumetric Images</a:t>
             </a:r>
             <a:endParaRPr lang="en-US" dirty="0">
               <a:solidFill>
@@ -15135,12 +14957,6 @@
               </a:rPr>
               <a:t>data set, regions within the visual cortex show varying time to peak response, corresponding to the varied position of the rotating checkerboard wedge. </a:t>
             </a:r>
-            <a:endParaRPr lang="en-US" sz="2000" dirty="0" smtClean="0">
-              <a:solidFill>
-                <a:prstClr val="white"/>
-              </a:solidFill>
-              <a:latin typeface="Calibri" panose="020F0502020204030204"/>
-            </a:endParaRPr>
           </a:p>
           <a:p>
             <a:pPr marL="285750" lvl="1" indent="-342900">
@@ -15168,32 +14984,8 @@
                 </a:solidFill>
                 <a:latin typeface="Calibri" panose="020F0502020204030204"/>
               </a:rPr>
-              <a:t>These data are block-averaged, which reduces variance in the reconstructed signals. Visualizing the </a:t>
-            </a:r>
-            <a:r>
-              <a:rPr lang="en-US" sz="2000" dirty="0" smtClean="0">
-                <a:solidFill>
-                  <a:prstClr val="white"/>
-                </a:solidFill>
-                <a:latin typeface="Calibri" panose="020F0502020204030204"/>
-              </a:rPr>
-              <a:t>un-averaged </a:t>
-            </a:r>
-            <a:r>
-              <a:rPr lang="en-US" sz="2000" dirty="0" smtClean="0">
-                <a:solidFill>
-                  <a:prstClr val="white"/>
-                </a:solidFill>
-                <a:latin typeface="Calibri" panose="020F0502020204030204"/>
-              </a:rPr>
-              <a:t>data (next) can help in interpretation. </a:t>
-            </a:r>
-            <a:endParaRPr lang="en-US" sz="2000" dirty="0" smtClean="0">
-              <a:solidFill>
-                <a:prstClr val="white"/>
-              </a:solidFill>
-              <a:latin typeface="Calibri" panose="020F0502020204030204"/>
-            </a:endParaRPr>
+              <a:t>These data are block-averaged, which reduces variance in the reconstructed signals. Visualizing the un-averaged data (next) can help in interpretation. </a:t>
+            </a:r>
           </a:p>
           <a:p>
             <a:pPr marL="285750" lvl="1" indent="-342900">
@@ -15515,15 +15307,7 @@
                   <a:srgbClr val="FF0000"/>
                 </a:solidFill>
               </a:rPr>
-              <a:t>Visualization </a:t>
-            </a:r>
-            <a:r>
-              <a:rPr lang="en-US" dirty="0" smtClean="0">
-                <a:solidFill>
-                  <a:srgbClr val="FF0000"/>
-                </a:solidFill>
-              </a:rPr>
-              <a:t>of reconstructed data on a surface model of the cortex</a:t>
+              <a:t>Visualization of reconstructed data on a surface model of the cortex</a:t>
             </a:r>
             <a:endParaRPr lang="en-US" dirty="0">
               <a:solidFill>
@@ -16269,19 +16053,7 @@
             </a:r>
             <a:r>
               <a:rPr lang="en-US" sz="2000" dirty="0" smtClean="0"/>
-              <a:t> </a:t>
-            </a:r>
-            <a:r>
-              <a:rPr lang="en-US" sz="2000" dirty="0" smtClean="0"/>
-              <a:t>Tutorial for the full processing of CCW data </a:t>
-            </a:r>
-            <a:r>
-              <a:rPr lang="en-US" sz="2000" dirty="0" smtClean="0"/>
-              <a:t>acquired with the </a:t>
-            </a:r>
-            <a:r>
-              <a:rPr lang="en-US" sz="2000" dirty="0" smtClean="0"/>
-              <a:t>24x28 visual pad.</a:t>
+              <a:t> Tutorial for the full processing of CCW data acquired with the 24x28 visual pad.</a:t>
             </a:r>
           </a:p>
           <a:p>
@@ -16977,11 +16749,7 @@
             <a:pPr lvl="1"/>
             <a:r>
               <a:rPr lang="en-US" dirty="0"/>
-              <a:t>B: modeling of the </a:t>
-            </a:r>
-            <a:r>
-              <a:rPr lang="en-US" dirty="0"/>
-              <a:t>tissue shape, optical property distribution, and source/detector </a:t>
+              <a:t>B: modeling of the tissue shape, optical property distribution, and source/detector </a:t>
             </a:r>
             <a:r>
               <a:rPr lang="en-US" dirty="0" smtClean="0"/>
@@ -17422,30 +17190,14 @@
             <a:pPr lvl="1"/>
             <a:r>
               <a:rPr lang="en-US" dirty="0" smtClean="0"/>
-              <a:t>Generate </a:t>
-            </a:r>
+              <a:t>Generate raw data quality assessment figures</a:t>
+            </a:r>
+          </a:p>
+          <a:p>
+            <a:pPr lvl="1"/>
             <a:r>
               <a:rPr lang="en-US" dirty="0" smtClean="0"/>
-              <a:t>raw data </a:t>
-            </a:r>
-            <a:r>
-              <a:rPr lang="en-US" dirty="0" smtClean="0"/>
-              <a:t>quality assessment figures</a:t>
-            </a:r>
-          </a:p>
-          <a:p>
-            <a:pPr lvl="1"/>
-            <a:r>
-              <a:rPr lang="en-US" dirty="0" smtClean="0"/>
-              <a:t>Process and visualize </a:t>
-            </a:r>
-            <a:r>
-              <a:rPr lang="en-US" dirty="0" smtClean="0"/>
-              <a:t>source-detector </a:t>
-            </a:r>
-            <a:r>
-              <a:rPr lang="en-US" dirty="0" smtClean="0"/>
-              <a:t>measurements</a:t>
+              <a:t>Process and visualize source-detector measurements</a:t>
             </a:r>
           </a:p>
           <a:p>
@@ -17923,11 +17675,7 @@
           <a:p>
             <a:r>
               <a:rPr lang="en-US" dirty="0" smtClean="0"/>
-              <a:t>To fully processes the Sample Datasets contained within the toolbox, you will need to generate the Sensitivity matrices for the 24x28 and 96x92 (source x detector) arrays</a:t>
-            </a:r>
-            <a:r>
-              <a:rPr lang="en-US" dirty="0" smtClean="0"/>
-              <a:t>.</a:t>
+              <a:t>To fully processes the Sample Datasets contained within the toolbox, you will need to generate the Sensitivity matrices for the 24x28 and 96x92 (source x detector) arrays.</a:t>
             </a:r>
           </a:p>
           <a:p>
@@ -18142,15 +17890,7 @@
                   <a:srgbClr val="FF0000"/>
                 </a:solidFill>
               </a:rPr>
-              <a:t>NeuroDOT_Data_Samp</a:t>
-            </a:r>
-            <a:r>
-              <a:rPr lang="en-US" dirty="0" smtClean="0">
-                <a:solidFill>
-                  <a:srgbClr val="FF0000"/>
-                </a:solidFill>
-              </a:rPr>
-              <a:t>le_CCW1.mat</a:t>
+              <a:t>NeuroDOT_Data_Sample_CCW1.mat</a:t>
             </a:r>
             <a:endParaRPr lang="en-US" dirty="0">
               <a:solidFill>
@@ -18676,15 +18416,7 @@
                   <a:srgbClr val="FF0000"/>
                 </a:solidFill>
               </a:rPr>
-              <a:t>Flow Chart for Pre-processing </a:t>
-            </a:r>
-            <a:r>
-              <a:rPr lang="en-US" dirty="0" smtClean="0">
-                <a:solidFill>
-                  <a:srgbClr val="FF0000"/>
-                </a:solidFill>
-              </a:rPr>
-              <a:t>and Image Reconstruction</a:t>
+              <a:t>Flow Chart for Pre-processing and Image Reconstruction</a:t>
             </a:r>
             <a:endParaRPr lang="en-US" dirty="0">
               <a:solidFill>
@@ -19692,23 +19424,7 @@
                   <a:srgbClr val="FF0000"/>
                 </a:solidFill>
               </a:rPr>
-              <a:t>Raw Data </a:t>
-            </a:r>
-            <a:r>
-              <a:rPr lang="en-US" dirty="0" smtClean="0">
-                <a:solidFill>
-                  <a:srgbClr val="FF0000"/>
-                </a:solidFill>
-              </a:rPr>
-              <a:t>Quality </a:t>
-            </a:r>
-            <a:r>
-              <a:rPr lang="en-US" dirty="0" smtClean="0">
-                <a:solidFill>
-                  <a:srgbClr val="FF0000"/>
-                </a:solidFill>
-              </a:rPr>
-              <a:t>Assessment: </a:t>
+              <a:t>Raw Data Quality Assessment: </a:t>
             </a:r>
             <a:br>
               <a:rPr lang="en-US" dirty="0" smtClean="0">
@@ -19723,15 +19439,7 @@
                   <a:srgbClr val="FF0000"/>
                 </a:solidFill>
               </a:rPr>
-              <a:t>Time </a:t>
-            </a:r>
-            <a:r>
-              <a:rPr lang="en-US" dirty="0" smtClean="0">
-                <a:solidFill>
-                  <a:srgbClr val="FF0000"/>
-                </a:solidFill>
-              </a:rPr>
-              <a:t>Traces</a:t>
+              <a:t>Time Traces</a:t>
             </a:r>
             <a:endParaRPr lang="en-US" dirty="0">
               <a:solidFill>
@@ -20112,23 +19820,7 @@
                   <a:srgbClr val="FF0000"/>
                 </a:solidFill>
               </a:rPr>
-              <a:t>Raw Data </a:t>
-            </a:r>
-            <a:r>
-              <a:rPr lang="en-US" dirty="0" smtClean="0">
-                <a:solidFill>
-                  <a:srgbClr val="FF0000"/>
-                </a:solidFill>
-              </a:rPr>
-              <a:t>Quality </a:t>
-            </a:r>
-            <a:r>
-              <a:rPr lang="en-US" dirty="0" smtClean="0">
-                <a:solidFill>
-                  <a:srgbClr val="FF0000"/>
-                </a:solidFill>
-              </a:rPr>
-              <a:t>Assessment:</a:t>
+              <a:t>Raw Data Quality Assessment:</a:t>
             </a:r>
             <a:br>
               <a:rPr lang="en-US" dirty="0" smtClean="0">
@@ -20435,23 +20127,7 @@
                   <a:srgbClr val="FF0000"/>
                 </a:solidFill>
               </a:rPr>
-              <a:t>Raw Data </a:t>
-            </a:r>
-            <a:r>
-              <a:rPr lang="en-US" dirty="0" smtClean="0">
-                <a:solidFill>
-                  <a:srgbClr val="FF0000"/>
-                </a:solidFill>
-              </a:rPr>
-              <a:t>Quality </a:t>
-            </a:r>
-            <a:r>
-              <a:rPr lang="en-US" dirty="0" smtClean="0">
-                <a:solidFill>
-                  <a:srgbClr val="FF0000"/>
-                </a:solidFill>
-              </a:rPr>
-              <a:t>Assessment:</a:t>
+              <a:t>Raw Data Quality Assessment:</a:t>
             </a:r>
             <a:br>
               <a:rPr lang="en-US" dirty="0" smtClean="0">
@@ -20618,76 +20294,31 @@
               <a:rPr lang="en-US" dirty="0" smtClean="0">
                 <a:latin typeface="Calibri" panose="020F0502020204030204" pitchFamily="34" charset="0"/>
               </a:rPr>
-              <a:t>at approximately 1 </a:t>
-            </a:r>
+              <a:t>at approximately 1 Hz.</a:t>
+            </a:r>
+          </a:p>
+          <a:p>
             <a:r>
               <a:rPr lang="en-US" dirty="0" smtClean="0">
                 <a:latin typeface="Calibri" panose="020F0502020204030204" pitchFamily="34" charset="0"/>
               </a:rPr>
-              <a:t>Hz.</a:t>
-            </a:r>
-            <a:endParaRPr lang="en-US" dirty="0" smtClean="0">
-              <a:latin typeface="Calibri" panose="020F0502020204030204" pitchFamily="34" charset="0"/>
-            </a:endParaRPr>
+              <a:t>(Lower left) Spectral measures averaged over several time traces show strong peaks at ~1Hz (cardiac pulse) and approximately 1/26 Hz (the stimulus frequency).</a:t>
+            </a:r>
           </a:p>
           <a:p>
             <a:r>
               <a:rPr lang="en-US" dirty="0" smtClean="0">
                 <a:latin typeface="Calibri" panose="020F0502020204030204" pitchFamily="34" charset="0"/>
               </a:rPr>
-              <a:t>(Lower left) Spectral measures averaged over several time traces show strong peaks at </a:t>
-            </a:r>
+              <a:t>(Upper right) Light level (log) vs. source-detector distance shows expected falloff, with cross-talk at distances &gt; 45 mm.</a:t>
+            </a:r>
+          </a:p>
+          <a:p>
             <a:r>
               <a:rPr lang="en-US" dirty="0" smtClean="0">
                 <a:latin typeface="Calibri" panose="020F0502020204030204" pitchFamily="34" charset="0"/>
               </a:rPr>
-              <a:t>~1Hz </a:t>
-            </a:r>
-            <a:r>
-              <a:rPr lang="en-US" dirty="0" smtClean="0">
-                <a:latin typeface="Calibri" panose="020F0502020204030204" pitchFamily="34" charset="0"/>
-              </a:rPr>
-              <a:t>(cardiac pulse) and approximately 1/26 Hz (the stimulus frequency</a:t>
-            </a:r>
-            <a:r>
-              <a:rPr lang="en-US" dirty="0" smtClean="0">
-                <a:latin typeface="Calibri" panose="020F0502020204030204" pitchFamily="34" charset="0"/>
-              </a:rPr>
-              <a:t>).</a:t>
-            </a:r>
-            <a:endParaRPr lang="en-US" dirty="0" smtClean="0">
-              <a:latin typeface="Calibri" panose="020F0502020204030204" pitchFamily="34" charset="0"/>
-            </a:endParaRPr>
-          </a:p>
-          <a:p>
-            <a:r>
-              <a:rPr lang="en-US" dirty="0" smtClean="0">
-                <a:latin typeface="Calibri" panose="020F0502020204030204" pitchFamily="34" charset="0"/>
-              </a:rPr>
-              <a:t>(Upper right) Light level (log) vs. source-detector distance shows expected falloff, with cross-talk at distances &gt; 45 </a:t>
-            </a:r>
-            <a:r>
-              <a:rPr lang="en-US" dirty="0" smtClean="0">
-                <a:latin typeface="Calibri" panose="020F0502020204030204" pitchFamily="34" charset="0"/>
-              </a:rPr>
-              <a:t>mm.</a:t>
-            </a:r>
-            <a:endParaRPr lang="en-US" dirty="0" smtClean="0">
-              <a:latin typeface="Calibri" panose="020F0502020204030204" pitchFamily="34" charset="0"/>
-            </a:endParaRPr>
-          </a:p>
-          <a:p>
-            <a:r>
-              <a:rPr lang="en-US" dirty="0" smtClean="0">
-                <a:latin typeface="Calibri" panose="020F0502020204030204" pitchFamily="34" charset="0"/>
-              </a:rPr>
-              <a:t>(Lower right) Histogram of signal % standard deviation shows several measurements below ‘good measurement’ threshold </a:t>
-            </a:r>
-            <a:r>
-              <a:rPr lang="en-US" dirty="0" smtClean="0">
-                <a:latin typeface="Calibri" panose="020F0502020204030204" pitchFamily="34" charset="0"/>
-              </a:rPr>
-              <a:t>of 7.5%.</a:t>
+              <a:t>(Lower right) Histogram of signal % standard deviation shows several measurements below ‘good measurement’ threshold of 7.5%.</a:t>
             </a:r>
             <a:endParaRPr lang="en-US" dirty="0">
               <a:latin typeface="Calibri" panose="020F0502020204030204" pitchFamily="34" charset="0"/>

</xml_diff>